<commit_message>
Looked over docs and made two small changes. Added some time.
</commit_message>
<xml_diff>
--- a/docs/Senior Capstone Project Proposal - Team 6.pptx
+++ b/docs/Senior Capstone Project Proposal - Team 6.pptx
@@ -114,6 +114,11 @@
       </a:defRPr>
     </a:lvl9pPr>
   </p:defaultTextStyle>
+  <p:extLst>
+    <p:ext uri="{EFAFB233-063F-42B5-8137-9DF3F51BA10A}">
+      <p15:sldGuideLst xmlns:p15="http://schemas.microsoft.com/office/powerpoint/2012/main"/>
+    </p:ext>
+  </p:extLst>
 </p:presentation>
 </file>
 
@@ -4520,7 +4525,11 @@
             </a:pPr>
             <a:r>
               <a:rPr lang="en-US" dirty="0" smtClean="0"/>
-              <a:t>Unaided assembly of modules into a predetermined formation from completely random starting points</a:t>
+              <a:t>Achieving unaided </a:t>
+            </a:r>
+            <a:r>
+              <a:rPr lang="en-US" dirty="0" smtClean="0"/>
+              <a:t>assembly of modules into a predetermined formation from completely random starting points</a:t>
             </a:r>
             <a:endParaRPr lang="en-US" dirty="0"/>
           </a:p>
@@ -4620,7 +4629,6 @@
               <a:rPr lang="en-US" dirty="0" smtClean="0"/>
               <a:t> Simulator</a:t>
             </a:r>
-            <a:endParaRPr lang="en-US" dirty="0" smtClean="0"/>
           </a:p>
           <a:p>
             <a:endParaRPr lang="en-US" dirty="0" smtClean="0"/>

</xml_diff>